<commit_message>
cleaning the code and make multiple graph panels
</commit_message>
<xml_diff>
--- a/Projects/M1 and M2/Project_poster.pptx
+++ b/Projects/M1 and M2/Project_poster.pptx
@@ -254,7 +254,7 @@
           <a:p>
             <a:fld id="{D5BC3664-0727-6046-9D17-0BC09E5D8426}" type="datetimeFigureOut">
               <a:rPr lang="en-CH" smtClean="0"/>
-              <a:t>11.10.20</a:t>
+              <a:t>14.10.20</a:t>
             </a:fld>
             <a:endParaRPr lang="en-CH"/>
           </a:p>
@@ -424,7 +424,7 @@
           <a:p>
             <a:fld id="{D5BC3664-0727-6046-9D17-0BC09E5D8426}" type="datetimeFigureOut">
               <a:rPr lang="en-CH" smtClean="0"/>
-              <a:t>11.10.20</a:t>
+              <a:t>14.10.20</a:t>
             </a:fld>
             <a:endParaRPr lang="en-CH"/>
           </a:p>
@@ -604,7 +604,7 @@
           <a:p>
             <a:fld id="{D5BC3664-0727-6046-9D17-0BC09E5D8426}" type="datetimeFigureOut">
               <a:rPr lang="en-CH" smtClean="0"/>
-              <a:t>11.10.20</a:t>
+              <a:t>14.10.20</a:t>
             </a:fld>
             <a:endParaRPr lang="en-CH"/>
           </a:p>
@@ -774,7 +774,7 @@
           <a:p>
             <a:fld id="{D5BC3664-0727-6046-9D17-0BC09E5D8426}" type="datetimeFigureOut">
               <a:rPr lang="en-CH" smtClean="0"/>
-              <a:t>11.10.20</a:t>
+              <a:t>14.10.20</a:t>
             </a:fld>
             <a:endParaRPr lang="en-CH"/>
           </a:p>
@@ -1018,7 +1018,7 @@
           <a:p>
             <a:fld id="{D5BC3664-0727-6046-9D17-0BC09E5D8426}" type="datetimeFigureOut">
               <a:rPr lang="en-CH" smtClean="0"/>
-              <a:t>11.10.20</a:t>
+              <a:t>14.10.20</a:t>
             </a:fld>
             <a:endParaRPr lang="en-CH"/>
           </a:p>
@@ -1250,7 +1250,7 @@
           <a:p>
             <a:fld id="{D5BC3664-0727-6046-9D17-0BC09E5D8426}" type="datetimeFigureOut">
               <a:rPr lang="en-CH" smtClean="0"/>
-              <a:t>11.10.20</a:t>
+              <a:t>14.10.20</a:t>
             </a:fld>
             <a:endParaRPr lang="en-CH"/>
           </a:p>
@@ -1617,7 +1617,7 @@
           <a:p>
             <a:fld id="{D5BC3664-0727-6046-9D17-0BC09E5D8426}" type="datetimeFigureOut">
               <a:rPr lang="en-CH" smtClean="0"/>
-              <a:t>11.10.20</a:t>
+              <a:t>14.10.20</a:t>
             </a:fld>
             <a:endParaRPr lang="en-CH"/>
           </a:p>
@@ -1735,7 +1735,7 @@
           <a:p>
             <a:fld id="{D5BC3664-0727-6046-9D17-0BC09E5D8426}" type="datetimeFigureOut">
               <a:rPr lang="en-CH" smtClean="0"/>
-              <a:t>11.10.20</a:t>
+              <a:t>14.10.20</a:t>
             </a:fld>
             <a:endParaRPr lang="en-CH"/>
           </a:p>
@@ -1830,7 +1830,7 @@
           <a:p>
             <a:fld id="{D5BC3664-0727-6046-9D17-0BC09E5D8426}" type="datetimeFigureOut">
               <a:rPr lang="en-CH" smtClean="0"/>
-              <a:t>11.10.20</a:t>
+              <a:t>14.10.20</a:t>
             </a:fld>
             <a:endParaRPr lang="en-CH"/>
           </a:p>
@@ -2107,7 +2107,7 @@
           <a:p>
             <a:fld id="{D5BC3664-0727-6046-9D17-0BC09E5D8426}" type="datetimeFigureOut">
               <a:rPr lang="en-CH" smtClean="0"/>
-              <a:t>11.10.20</a:t>
+              <a:t>14.10.20</a:t>
             </a:fld>
             <a:endParaRPr lang="en-CH"/>
           </a:p>
@@ -2364,7 +2364,7 @@
           <a:p>
             <a:fld id="{D5BC3664-0727-6046-9D17-0BC09E5D8426}" type="datetimeFigureOut">
               <a:rPr lang="en-CH" smtClean="0"/>
-              <a:t>11.10.20</a:t>
+              <a:t>14.10.20</a:t>
             </a:fld>
             <a:endParaRPr lang="en-CH"/>
           </a:p>
@@ -2577,7 +2577,7 @@
           <a:p>
             <a:fld id="{D5BC3664-0727-6046-9D17-0BC09E5D8426}" type="datetimeFigureOut">
               <a:rPr lang="en-CH" smtClean="0"/>
-              <a:t>11.10.20</a:t>
+              <a:t>14.10.20</a:t>
             </a:fld>
             <a:endParaRPr lang="en-CH"/>
           </a:p>
@@ -3205,8 +3205,8 @@
         </p:nvSpPr>
         <p:spPr>
           <a:xfrm>
-            <a:off x="295765" y="4424417"/>
-            <a:ext cx="9009669" cy="4616648"/>
+            <a:off x="295765" y="4588047"/>
+            <a:ext cx="9009669" cy="5478423"/>
           </a:xfrm>
           <a:prstGeom prst="rect">
             <a:avLst/>
@@ -3285,11 +3285,95 @@
             <a:endParaRPr lang="en-GB" sz="1400" dirty="0"/>
           </a:p>
           <a:p>
-            <a:endParaRPr lang="en-GB" sz="1400"/>
-          </a:p>
-          <a:p>
-            <a:r>
-              <a:rPr lang="en-GB" sz="1400"/>
+            <a:endParaRPr lang="en-GB" sz="1400" dirty="0"/>
+          </a:p>
+          <a:p>
+            <a:endParaRPr lang="en-GB" sz="1400" dirty="0"/>
+          </a:p>
+          <a:p>
+            <a:endParaRPr lang="en-GB" sz="1400" dirty="0"/>
+          </a:p>
+          <a:p>
+            <a:endParaRPr lang="en-GB" sz="1400" dirty="0"/>
+          </a:p>
+          <a:p>
+            <a:endParaRPr lang="en-GB" sz="1400" dirty="0"/>
+          </a:p>
+          <a:p>
+            <a:r>
+              <a:rPr lang="en-GB" sz="1400" dirty="0"/>
+              <a:t>B</a:t>
+            </a:r>
+            <a:r>
+              <a:rPr lang="en-CH" sz="1400" dirty="0"/>
+              <a:t>la blabla</a:t>
+            </a:r>
+          </a:p>
+        </p:txBody>
+      </p:sp>
+      <p:sp>
+        <p:nvSpPr>
+          <p:cNvPr id="7" name="TextBox 6">
+            <a:extLst>
+              <a:ext uri="{FF2B5EF4-FFF2-40B4-BE49-F238E27FC236}">
+                <a16:creationId xmlns:a16="http://schemas.microsoft.com/office/drawing/2014/main" id="{BCFF7616-3F7B-6641-B3DA-BAEE2346560F}"/>
+              </a:ext>
+            </a:extLst>
+          </p:cNvPr>
+          <p:cNvSpPr txBox="1"/>
+          <p:nvPr/>
+        </p:nvSpPr>
+        <p:spPr>
+          <a:xfrm>
+            <a:off x="295765" y="10506564"/>
+            <a:ext cx="9009669" cy="2031325"/>
+          </a:xfrm>
+          <a:prstGeom prst="rect">
+            <a:avLst/>
+          </a:prstGeom>
+          <a:noFill/>
+          <a:ln w="19050">
+            <a:solidFill>
+              <a:schemeClr val="tx1"/>
+            </a:solidFill>
+          </a:ln>
+        </p:spPr>
+        <p:txBody>
+          <a:bodyPr wrap="square" rtlCol="0">
+            <a:spAutoFit/>
+          </a:bodyPr>
+          <a:lstStyle/>
+          <a:p>
+            <a:pPr algn="ctr"/>
+            <a:r>
+              <a:rPr lang="en-CH" sz="1400" dirty="0"/>
+              <a:t>Results</a:t>
+            </a:r>
+          </a:p>
+          <a:p>
+            <a:endParaRPr lang="en-CH" sz="1400" dirty="0"/>
+          </a:p>
+          <a:p>
+            <a:endParaRPr lang="en-CH" sz="1400" dirty="0"/>
+          </a:p>
+          <a:p>
+            <a:endParaRPr lang="en-GB" sz="1400" dirty="0"/>
+          </a:p>
+          <a:p>
+            <a:endParaRPr lang="en-GB" sz="1400" dirty="0"/>
+          </a:p>
+          <a:p>
+            <a:endParaRPr lang="en-GB" sz="1400" dirty="0"/>
+          </a:p>
+          <a:p>
+            <a:endParaRPr lang="en-GB" sz="1400" dirty="0"/>
+          </a:p>
+          <a:p>
+            <a:endParaRPr lang="en-GB" sz="1400" dirty="0"/>
+          </a:p>
+          <a:p>
+            <a:r>
+              <a:rPr lang="en-GB" sz="1400" dirty="0"/>
               <a:t>B</a:t>
             </a:r>
             <a:r>

</xml_diff>

<commit_message>
fixing problem loading data from the worldbank API
</commit_message>
<xml_diff>
--- a/Projects/M1 and M2/Project_poster.pptx
+++ b/Projects/M1 and M2/Project_poster.pptx
@@ -254,7 +254,7 @@
           <a:p>
             <a:fld id="{D5BC3664-0727-6046-9D17-0BC09E5D8426}" type="datetimeFigureOut">
               <a:rPr lang="en-CH" smtClean="0"/>
-              <a:t>14.10.20</a:t>
+              <a:t>15.10.20</a:t>
             </a:fld>
             <a:endParaRPr lang="en-CH"/>
           </a:p>
@@ -424,7 +424,7 @@
           <a:p>
             <a:fld id="{D5BC3664-0727-6046-9D17-0BC09E5D8426}" type="datetimeFigureOut">
               <a:rPr lang="en-CH" smtClean="0"/>
-              <a:t>14.10.20</a:t>
+              <a:t>15.10.20</a:t>
             </a:fld>
             <a:endParaRPr lang="en-CH"/>
           </a:p>
@@ -604,7 +604,7 @@
           <a:p>
             <a:fld id="{D5BC3664-0727-6046-9D17-0BC09E5D8426}" type="datetimeFigureOut">
               <a:rPr lang="en-CH" smtClean="0"/>
-              <a:t>14.10.20</a:t>
+              <a:t>15.10.20</a:t>
             </a:fld>
             <a:endParaRPr lang="en-CH"/>
           </a:p>
@@ -774,7 +774,7 @@
           <a:p>
             <a:fld id="{D5BC3664-0727-6046-9D17-0BC09E5D8426}" type="datetimeFigureOut">
               <a:rPr lang="en-CH" smtClean="0"/>
-              <a:t>14.10.20</a:t>
+              <a:t>15.10.20</a:t>
             </a:fld>
             <a:endParaRPr lang="en-CH"/>
           </a:p>
@@ -1018,7 +1018,7 @@
           <a:p>
             <a:fld id="{D5BC3664-0727-6046-9D17-0BC09E5D8426}" type="datetimeFigureOut">
               <a:rPr lang="en-CH" smtClean="0"/>
-              <a:t>14.10.20</a:t>
+              <a:t>15.10.20</a:t>
             </a:fld>
             <a:endParaRPr lang="en-CH"/>
           </a:p>
@@ -1250,7 +1250,7 @@
           <a:p>
             <a:fld id="{D5BC3664-0727-6046-9D17-0BC09E5D8426}" type="datetimeFigureOut">
               <a:rPr lang="en-CH" smtClean="0"/>
-              <a:t>14.10.20</a:t>
+              <a:t>15.10.20</a:t>
             </a:fld>
             <a:endParaRPr lang="en-CH"/>
           </a:p>
@@ -1617,7 +1617,7 @@
           <a:p>
             <a:fld id="{D5BC3664-0727-6046-9D17-0BC09E5D8426}" type="datetimeFigureOut">
               <a:rPr lang="en-CH" smtClean="0"/>
-              <a:t>14.10.20</a:t>
+              <a:t>15.10.20</a:t>
             </a:fld>
             <a:endParaRPr lang="en-CH"/>
           </a:p>
@@ -1735,7 +1735,7 @@
           <a:p>
             <a:fld id="{D5BC3664-0727-6046-9D17-0BC09E5D8426}" type="datetimeFigureOut">
               <a:rPr lang="en-CH" smtClean="0"/>
-              <a:t>14.10.20</a:t>
+              <a:t>15.10.20</a:t>
             </a:fld>
             <a:endParaRPr lang="en-CH"/>
           </a:p>
@@ -1830,7 +1830,7 @@
           <a:p>
             <a:fld id="{D5BC3664-0727-6046-9D17-0BC09E5D8426}" type="datetimeFigureOut">
               <a:rPr lang="en-CH" smtClean="0"/>
-              <a:t>14.10.20</a:t>
+              <a:t>15.10.20</a:t>
             </a:fld>
             <a:endParaRPr lang="en-CH"/>
           </a:p>
@@ -2107,7 +2107,7 @@
           <a:p>
             <a:fld id="{D5BC3664-0727-6046-9D17-0BC09E5D8426}" type="datetimeFigureOut">
               <a:rPr lang="en-CH" smtClean="0"/>
-              <a:t>14.10.20</a:t>
+              <a:t>15.10.20</a:t>
             </a:fld>
             <a:endParaRPr lang="en-CH"/>
           </a:p>
@@ -2364,7 +2364,7 @@
           <a:p>
             <a:fld id="{D5BC3664-0727-6046-9D17-0BC09E5D8426}" type="datetimeFigureOut">
               <a:rPr lang="en-CH" smtClean="0"/>
-              <a:t>14.10.20</a:t>
+              <a:t>15.10.20</a:t>
             </a:fld>
             <a:endParaRPr lang="en-CH"/>
           </a:p>
@@ -2577,7 +2577,7 @@
           <a:p>
             <a:fld id="{D5BC3664-0727-6046-9D17-0BC09E5D8426}" type="datetimeFigureOut">
               <a:rPr lang="en-CH" smtClean="0"/>
-              <a:t>14.10.20</a:t>
+              <a:t>15.10.20</a:t>
             </a:fld>
             <a:endParaRPr lang="en-CH"/>
           </a:p>
@@ -3346,9 +3346,10 @@
           <a:p>
             <a:pPr algn="ctr"/>
             <a:r>
-              <a:rPr lang="en-CH" sz="1400" dirty="0"/>
-              <a:t>Results</a:t>
-            </a:r>
+              <a:rPr lang="en-CH" sz="1400"/>
+              <a:t>Conclusions</a:t>
+            </a:r>
+            <a:endParaRPr lang="en-CH" sz="1400" dirty="0"/>
           </a:p>
           <a:p>
             <a:endParaRPr lang="en-CH" sz="1400" dirty="0"/>

</xml_diff>